<commit_message>
First draft of the purrr chapter
</commit_message>
<xml_diff>
--- a/img/07_part_repeated_operations/04_for_loops/For loops.pptx
+++ b/img/07_part_repeated_operations/04_for_loops/For loops.pptx
@@ -3306,7 +3306,7 @@
           </a:ln>
           <a:extLst>
             <a:ext uri="{C572A759-6A51-4108-AA02-DFA0A04FC94B}">
-              <ma14:wrappingTextBoxFlag xmlns="" xmlns:m="http://schemas.openxmlformats.org/officeDocument/2006/math" xmlns:a14="http://schemas.microsoft.com/office/drawing/2010/main" xmlns:ma14="http://schemas.microsoft.com/office/mac/drawingml/2011/main" val="1"/>
+              <ma14:wrappingTextBoxFlag xmlns:ma14="http://schemas.microsoft.com/office/mac/drawingml/2011/main" xmlns:a14="http://schemas.microsoft.com/office/drawing/2010/main" xmlns:m="http://schemas.openxmlformats.org/officeDocument/2006/math" xmlns="" val="1"/>
             </a:ext>
           </a:extLst>
         </p:spPr>
@@ -3345,7 +3345,7 @@
           </a:ln>
           <a:extLst>
             <a:ext uri="{C572A759-6A51-4108-AA02-DFA0A04FC94B}">
-              <ma14:wrappingTextBoxFlag xmlns="" xmlns:m="http://schemas.openxmlformats.org/officeDocument/2006/math" xmlns:a14="http://schemas.microsoft.com/office/drawing/2010/main" xmlns:ma14="http://schemas.microsoft.com/office/mac/drawingml/2011/main" val="1"/>
+              <ma14:wrappingTextBoxFlag xmlns:ma14="http://schemas.microsoft.com/office/mac/drawingml/2011/main" xmlns:a14="http://schemas.microsoft.com/office/drawing/2010/main" xmlns:m="http://schemas.openxmlformats.org/officeDocument/2006/math" xmlns="" val="1"/>
             </a:ext>
           </a:extLst>
         </p:spPr>
@@ -4805,7 +4805,7 @@
           <p:nvPr>
             <p:extLst>
               <p:ext uri="{D42A27DB-BD31-4B8C-83A1-F6EECF244321}">
-                <p14:modId xmlns:p14="http://schemas.microsoft.com/office/powerpoint/2010/main" val="3479548787"/>
+                <p14:modId xmlns:p14="http://schemas.microsoft.com/office/powerpoint/2010/main" val="4290056039"/>
               </p:ext>
             </p:extLst>
           </p:nvPr>
@@ -5605,7 +5605,7 @@
                       </a:r>
                       <a:r>
                         <a:rPr lang="en-US" sz="4000" dirty="0"/>
-                        <a:t>-0.56047565 -0.23017749 1.55870831 0.07050839 0.12928774 1.71506499 0.46091621 -1.26506123 -0.68685285 -0.44566197</a:t>
+                        <a:t>-0.56047565, -0.23017749, 1.55870831, 0.07050839, 0.12928774, 1.71506499, 0.46091621, -1.26506123, -0.68685285, -0.44566197</a:t>
                       </a:r>
                       <a:r>
                         <a:rPr lang="en-US" sz="4000" dirty="0">
@@ -6436,7 +6436,7 @@
           </a:ln>
           <a:extLst>
             <a:ext uri="{C572A759-6A51-4108-AA02-DFA0A04FC94B}">
-              <ma14:wrappingTextBoxFlag xmlns="" xmlns:m="http://schemas.openxmlformats.org/officeDocument/2006/math" xmlns:a14="http://schemas.microsoft.com/office/drawing/2010/main" xmlns:ma14="http://schemas.microsoft.com/office/mac/drawingml/2011/main" val="1"/>
+              <ma14:wrappingTextBoxFlag xmlns:ma14="http://schemas.microsoft.com/office/mac/drawingml/2011/main" xmlns:a14="http://schemas.microsoft.com/office/drawing/2010/main" xmlns:m="http://schemas.openxmlformats.org/officeDocument/2006/math" xmlns="" val="1"/>
             </a:ext>
           </a:extLst>
         </p:spPr>
@@ -6678,7 +6678,7 @@
         <p:dissolve/>
       </p:transition>
     </mc:Choice>
-    <mc:Fallback xmlns="" xmlns:m="http://schemas.openxmlformats.org/officeDocument/2006/math" xmlns:a14="http://schemas.microsoft.com/office/drawing/2010/main">
+    <mc:Fallback xmlns:a14="http://schemas.microsoft.com/office/drawing/2010/main" xmlns:m="http://schemas.openxmlformats.org/officeDocument/2006/math" xmlns="">
       <p:transition spd="slow">
         <p:fade/>
       </p:transition>
@@ -6711,7 +6711,7 @@
           <p:nvPr>
             <p:extLst>
               <p:ext uri="{D42A27DB-BD31-4B8C-83A1-F6EECF244321}">
-                <p14:modId xmlns:p14="http://schemas.microsoft.com/office/powerpoint/2010/main" val="928282600"/>
+                <p14:modId xmlns:p14="http://schemas.microsoft.com/office/powerpoint/2010/main" val="4126080059"/>
               </p:ext>
             </p:extLst>
           </p:nvPr>
@@ -7511,7 +7511,7 @@
                       </a:r>
                       <a:r>
                         <a:rPr lang="en-US" sz="4000" dirty="0"/>
-                        <a:t>-0.56047565 -0.23017749 1.55870831 0.07050839 0.12928774 1.71506499 0.46091621 -1.26506123 -0.68685285 -0.44566197</a:t>
+                        <a:t>-0.56047565, -0.23017749, 1.55870831, 0.07050839, 0.12928774, 1.71506499, 0.46091621, -1.26506123, -0.68685285, -0.44566197</a:t>
                       </a:r>
                       <a:r>
                         <a:rPr lang="en-US" sz="4000" dirty="0">
@@ -8387,7 +8387,7 @@
           </a:ln>
           <a:extLst>
             <a:ext uri="{C572A759-6A51-4108-AA02-DFA0A04FC94B}">
-              <ma14:wrappingTextBoxFlag xmlns="" xmlns:m="http://schemas.openxmlformats.org/officeDocument/2006/math" xmlns:a14="http://schemas.microsoft.com/office/drawing/2010/main" xmlns:ma14="http://schemas.microsoft.com/office/mac/drawingml/2011/main" val="1"/>
+              <ma14:wrappingTextBoxFlag xmlns:ma14="http://schemas.microsoft.com/office/mac/drawingml/2011/main" xmlns:a14="http://schemas.microsoft.com/office/drawing/2010/main" xmlns:m="http://schemas.openxmlformats.org/officeDocument/2006/math" xmlns="" val="1"/>
             </a:ext>
           </a:extLst>
         </p:spPr>
@@ -8629,7 +8629,7 @@
         <p:dissolve/>
       </p:transition>
     </mc:Choice>
-    <mc:Fallback xmlns="" xmlns:m="http://schemas.openxmlformats.org/officeDocument/2006/math" xmlns:a14="http://schemas.microsoft.com/office/drawing/2010/main">
+    <mc:Fallback xmlns:a14="http://schemas.microsoft.com/office/drawing/2010/main" xmlns:m="http://schemas.openxmlformats.org/officeDocument/2006/math" xmlns="">
       <p:transition spd="slow">
         <p:fade/>
       </p:transition>
@@ -8662,7 +8662,7 @@
           <p:nvPr>
             <p:extLst>
               <p:ext uri="{D42A27DB-BD31-4B8C-83A1-F6EECF244321}">
-                <p14:modId xmlns:p14="http://schemas.microsoft.com/office/powerpoint/2010/main" val="1392080327"/>
+                <p14:modId xmlns:p14="http://schemas.microsoft.com/office/powerpoint/2010/main" val="1514449777"/>
               </p:ext>
             </p:extLst>
           </p:nvPr>
@@ -9448,7 +9448,7 @@
                         <a:defRPr sz="1800"/>
                       </a:pPr>
                       <a:r>
-                        <a:rPr lang="en-US" sz="4000" b="1" dirty="0">
+                        <a:rPr lang="en-US" sz="4000" b="1">
                           <a:solidFill>
                             <a:srgbClr val="FF0000"/>
                           </a:solidFill>
@@ -9456,7 +9456,7 @@
                         <a:t>mean</a:t>
                       </a:r>
                       <a:r>
-                        <a:rPr lang="en-US" sz="4000" dirty="0">
+                        <a:rPr lang="en-US" sz="4000">
                           <a:solidFill>
                             <a:srgbClr val="FF0000"/>
                           </a:solidFill>
@@ -9464,17 +9464,22 @@
                         <a:t>(</a:t>
                       </a:r>
                       <a:r>
-                        <a:rPr lang="en-US" sz="4000" dirty="0"/>
-                        <a:t>-0.56047565 -0.23017749 1.55870831 0.07050839 0.12928774 1.71506499 0.46091621 -1.26506123 -0.68685285 -0.44566197</a:t>
-                      </a:r>
-                      <a:r>
-                        <a:rPr lang="en-US" sz="4000" dirty="0">
+                        <a:rPr lang="en-US" sz="4000"/>
+                        <a:t>-0.56047565, -0.23017749, 1.55870831, 0.07050839, 0.12928774, 1.71506499, 0.46091621, -1.26506123, -0.68685285, -0.44566197</a:t>
+                      </a:r>
+                      <a:r>
+                        <a:rPr lang="en-US" sz="4000">
                           <a:solidFill>
                             <a:srgbClr val="FF0000"/>
                           </a:solidFill>
                         </a:rPr>
                         <a:t>)</a:t>
                       </a:r>
+                      <a:endParaRPr lang="en-US" sz="4000" dirty="0">
+                        <a:solidFill>
+                          <a:srgbClr val="FF0000"/>
+                        </a:solidFill>
+                      </a:endParaRPr>
                     </a:p>
                   </a:txBody>
                   <a:tcPr marL="50800" marR="50800" marT="50800" marB="50800" anchor="ctr" horzOverflow="overflow">
@@ -10404,7 +10409,7 @@
           </a:ln>
           <a:extLst>
             <a:ext uri="{C572A759-6A51-4108-AA02-DFA0A04FC94B}">
-              <ma14:wrappingTextBoxFlag xmlns="" xmlns:m="http://schemas.openxmlformats.org/officeDocument/2006/math" xmlns:a14="http://schemas.microsoft.com/office/drawing/2010/main" xmlns:ma14="http://schemas.microsoft.com/office/mac/drawingml/2011/main" val="1"/>
+              <ma14:wrappingTextBoxFlag xmlns:ma14="http://schemas.microsoft.com/office/mac/drawingml/2011/main" xmlns:a14="http://schemas.microsoft.com/office/drawing/2010/main" xmlns:m="http://schemas.openxmlformats.org/officeDocument/2006/math" xmlns="" val="1"/>
             </a:ext>
           </a:extLst>
         </p:spPr>
@@ -10646,7 +10651,7 @@
         <p:dissolve/>
       </p:transition>
     </mc:Choice>
-    <mc:Fallback xmlns="" xmlns:m="http://schemas.openxmlformats.org/officeDocument/2006/math" xmlns:a14="http://schemas.microsoft.com/office/drawing/2010/main">
+    <mc:Fallback xmlns:a14="http://schemas.microsoft.com/office/drawing/2010/main" xmlns:m="http://schemas.openxmlformats.org/officeDocument/2006/math" xmlns="">
       <p:transition spd="slow">
         <p:fade/>
       </p:transition>
@@ -15890,7 +15895,7 @@
           </a:ln>
           <a:extLst>
             <a:ext uri="{C572A759-6A51-4108-AA02-DFA0A04FC94B}">
-              <ma14:wrappingTextBoxFlag xmlns="" xmlns:m="http://schemas.openxmlformats.org/officeDocument/2006/math" xmlns:a14="http://schemas.microsoft.com/office/drawing/2010/main" xmlns:ma14="http://schemas.microsoft.com/office/mac/drawingml/2011/main" val="1"/>
+              <ma14:wrappingTextBoxFlag xmlns:ma14="http://schemas.microsoft.com/office/mac/drawingml/2011/main" xmlns:a14="http://schemas.microsoft.com/office/drawing/2010/main" xmlns:m="http://schemas.openxmlformats.org/officeDocument/2006/math" xmlns="" val="1"/>
             </a:ext>
           </a:extLst>
         </p:spPr>
@@ -16090,7 +16095,7 @@
         <p:dissolve/>
       </p:transition>
     </mc:Choice>
-    <mc:Fallback xmlns="" xmlns:m="http://schemas.openxmlformats.org/officeDocument/2006/math" xmlns:a14="http://schemas.microsoft.com/office/drawing/2010/main">
+    <mc:Fallback xmlns:a14="http://schemas.microsoft.com/office/drawing/2010/main" xmlns:m="http://schemas.openxmlformats.org/officeDocument/2006/math" xmlns="">
       <p:transition spd="slow">
         <p:fade/>
       </p:transition>
@@ -17288,7 +17293,7 @@
           </a:ln>
           <a:extLst>
             <a:ext uri="{C572A759-6A51-4108-AA02-DFA0A04FC94B}">
-              <ma14:wrappingTextBoxFlag xmlns="" xmlns:m="http://schemas.openxmlformats.org/officeDocument/2006/math" xmlns:a14="http://schemas.microsoft.com/office/drawing/2010/main" xmlns:ma14="http://schemas.microsoft.com/office/mac/drawingml/2011/main" val="1"/>
+              <ma14:wrappingTextBoxFlag xmlns:ma14="http://schemas.microsoft.com/office/mac/drawingml/2011/main" xmlns:a14="http://schemas.microsoft.com/office/drawing/2010/main" xmlns:m="http://schemas.openxmlformats.org/officeDocument/2006/math" xmlns="" val="1"/>
             </a:ext>
           </a:extLst>
         </p:spPr>
@@ -17555,7 +17560,7 @@
         <p:dissolve/>
       </p:transition>
     </mc:Choice>
-    <mc:Fallback xmlns="" xmlns:m="http://schemas.openxmlformats.org/officeDocument/2006/math" xmlns:a14="http://schemas.microsoft.com/office/drawing/2010/main">
+    <mc:Fallback xmlns:a14="http://schemas.microsoft.com/office/drawing/2010/main" xmlns:m="http://schemas.openxmlformats.org/officeDocument/2006/math" xmlns="">
       <p:transition spd="slow">
         <p:fade/>
       </p:transition>
@@ -18797,7 +18802,7 @@
           </a:ln>
           <a:extLst>
             <a:ext uri="{C572A759-6A51-4108-AA02-DFA0A04FC94B}">
-              <ma14:wrappingTextBoxFlag xmlns="" xmlns:m="http://schemas.openxmlformats.org/officeDocument/2006/math" xmlns:a14="http://schemas.microsoft.com/office/drawing/2010/main" xmlns:ma14="http://schemas.microsoft.com/office/mac/drawingml/2011/main" val="1"/>
+              <ma14:wrappingTextBoxFlag xmlns:ma14="http://schemas.microsoft.com/office/mac/drawingml/2011/main" xmlns:a14="http://schemas.microsoft.com/office/drawing/2010/main" xmlns:m="http://schemas.openxmlformats.org/officeDocument/2006/math" xmlns="" val="1"/>
             </a:ext>
           </a:extLst>
         </p:spPr>
@@ -18997,7 +19002,7 @@
         <p:dissolve/>
       </p:transition>
     </mc:Choice>
-    <mc:Fallback xmlns="" xmlns:m="http://schemas.openxmlformats.org/officeDocument/2006/math" xmlns:a14="http://schemas.microsoft.com/office/drawing/2010/main">
+    <mc:Fallback xmlns:a14="http://schemas.microsoft.com/office/drawing/2010/main" xmlns:m="http://schemas.openxmlformats.org/officeDocument/2006/math" xmlns="">
       <p:transition spd="slow">
         <p:fade/>
       </p:transition>
@@ -20257,7 +20262,7 @@
           </a:ln>
           <a:extLst>
             <a:ext uri="{C572A759-6A51-4108-AA02-DFA0A04FC94B}">
-              <ma14:wrappingTextBoxFlag xmlns="" xmlns:m="http://schemas.openxmlformats.org/officeDocument/2006/math" xmlns:a14="http://schemas.microsoft.com/office/drawing/2010/main" xmlns:ma14="http://schemas.microsoft.com/office/mac/drawingml/2011/main" val="1"/>
+              <ma14:wrappingTextBoxFlag xmlns:ma14="http://schemas.microsoft.com/office/mac/drawingml/2011/main" xmlns:a14="http://schemas.microsoft.com/office/drawing/2010/main" xmlns:m="http://schemas.openxmlformats.org/officeDocument/2006/math" xmlns="" val="1"/>
             </a:ext>
           </a:extLst>
         </p:spPr>
@@ -20524,7 +20529,7 @@
         <p:dissolve/>
       </p:transition>
     </mc:Choice>
-    <mc:Fallback xmlns="" xmlns:m="http://schemas.openxmlformats.org/officeDocument/2006/math" xmlns:a14="http://schemas.microsoft.com/office/drawing/2010/main">
+    <mc:Fallback xmlns:a14="http://schemas.microsoft.com/office/drawing/2010/main" xmlns:m="http://schemas.openxmlformats.org/officeDocument/2006/math" xmlns="">
       <p:transition spd="slow">
         <p:fade/>
       </p:transition>
@@ -21832,7 +21837,7 @@
           </a:ln>
           <a:extLst>
             <a:ext uri="{C572A759-6A51-4108-AA02-DFA0A04FC94B}">
-              <ma14:wrappingTextBoxFlag xmlns="" xmlns:m="http://schemas.openxmlformats.org/officeDocument/2006/math" xmlns:a14="http://schemas.microsoft.com/office/drawing/2010/main" xmlns:ma14="http://schemas.microsoft.com/office/mac/drawingml/2011/main" val="1"/>
+              <ma14:wrappingTextBoxFlag xmlns:ma14="http://schemas.microsoft.com/office/mac/drawingml/2011/main" xmlns:a14="http://schemas.microsoft.com/office/drawing/2010/main" xmlns:m="http://schemas.openxmlformats.org/officeDocument/2006/math" xmlns="" val="1"/>
             </a:ext>
           </a:extLst>
         </p:spPr>
@@ -22032,7 +22037,7 @@
         <p:dissolve/>
       </p:transition>
     </mc:Choice>
-    <mc:Fallback xmlns="" xmlns:m="http://schemas.openxmlformats.org/officeDocument/2006/math" xmlns:a14="http://schemas.microsoft.com/office/drawing/2010/main">
+    <mc:Fallback xmlns:a14="http://schemas.microsoft.com/office/drawing/2010/main" xmlns:m="http://schemas.openxmlformats.org/officeDocument/2006/math" xmlns="">
       <p:transition spd="slow">
         <p:fade/>
       </p:transition>

</xml_diff>